<commit_message>
maj des prix capex opex 2020
</commit_message>
<xml_diff>
--- a/rapport.pptx
+++ b/rapport.pptx
@@ -7,6 +7,8 @@
   <p:sldIdLst>
     <p:sldId id="256" r:id="rId2"/>
     <p:sldId id="257" r:id="rId3"/>
+    <p:sldId id="258" r:id="rId4"/>
+    <p:sldId id="259" r:id="rId5"/>
   </p:sldIdLst>
   <p:sldSz cx="12192000" cy="6858000"/>
   <p:notesSz cx="6858000" cy="9144000"/>
@@ -105,6 +107,11 @@
       </a:defRPr>
     </a:lvl9pPr>
   </p:defaultTextStyle>
+  <p:extLst>
+    <p:ext uri="{EFAFB233-063F-42B5-8137-9DF3F51BA10A}">
+      <p15:sldGuideLst xmlns:p15="http://schemas.microsoft.com/office/powerpoint/2012/main"/>
+    </p:ext>
+  </p:extLst>
 </p:presentation>
 </file>
 
@@ -255,7 +262,7 @@
           <a:p>
             <a:fld id="{40A6E905-B5AB-AC44-9673-03A8CEA14BCA}" type="datetimeFigureOut">
               <a:rPr lang="fr-FR" smtClean="0"/>
-              <a:t>13/12/2023</a:t>
+              <a:t>15/12/2023</a:t>
             </a:fld>
             <a:endParaRPr lang="fr-FR"/>
           </a:p>
@@ -453,7 +460,7 @@
           <a:p>
             <a:fld id="{40A6E905-B5AB-AC44-9673-03A8CEA14BCA}" type="datetimeFigureOut">
               <a:rPr lang="fr-FR" smtClean="0"/>
-              <a:t>13/12/2023</a:t>
+              <a:t>15/12/2023</a:t>
             </a:fld>
             <a:endParaRPr lang="fr-FR"/>
           </a:p>
@@ -661,7 +668,7 @@
           <a:p>
             <a:fld id="{40A6E905-B5AB-AC44-9673-03A8CEA14BCA}" type="datetimeFigureOut">
               <a:rPr lang="fr-FR" smtClean="0"/>
-              <a:t>13/12/2023</a:t>
+              <a:t>15/12/2023</a:t>
             </a:fld>
             <a:endParaRPr lang="fr-FR"/>
           </a:p>
@@ -859,7 +866,7 @@
           <a:p>
             <a:fld id="{40A6E905-B5AB-AC44-9673-03A8CEA14BCA}" type="datetimeFigureOut">
               <a:rPr lang="fr-FR" smtClean="0"/>
-              <a:t>13/12/2023</a:t>
+              <a:t>15/12/2023</a:t>
             </a:fld>
             <a:endParaRPr lang="fr-FR"/>
           </a:p>
@@ -1134,7 +1141,7 @@
           <a:p>
             <a:fld id="{40A6E905-B5AB-AC44-9673-03A8CEA14BCA}" type="datetimeFigureOut">
               <a:rPr lang="fr-FR" smtClean="0"/>
-              <a:t>13/12/2023</a:t>
+              <a:t>15/12/2023</a:t>
             </a:fld>
             <a:endParaRPr lang="fr-FR"/>
           </a:p>
@@ -1399,7 +1406,7 @@
           <a:p>
             <a:fld id="{40A6E905-B5AB-AC44-9673-03A8CEA14BCA}" type="datetimeFigureOut">
               <a:rPr lang="fr-FR" smtClean="0"/>
-              <a:t>13/12/2023</a:t>
+              <a:t>15/12/2023</a:t>
             </a:fld>
             <a:endParaRPr lang="fr-FR"/>
           </a:p>
@@ -1811,7 +1818,7 @@
           <a:p>
             <a:fld id="{40A6E905-B5AB-AC44-9673-03A8CEA14BCA}" type="datetimeFigureOut">
               <a:rPr lang="fr-FR" smtClean="0"/>
-              <a:t>13/12/2023</a:t>
+              <a:t>15/12/2023</a:t>
             </a:fld>
             <a:endParaRPr lang="fr-FR"/>
           </a:p>
@@ -1952,7 +1959,7 @@
           <a:p>
             <a:fld id="{40A6E905-B5AB-AC44-9673-03A8CEA14BCA}" type="datetimeFigureOut">
               <a:rPr lang="fr-FR" smtClean="0"/>
-              <a:t>13/12/2023</a:t>
+              <a:t>15/12/2023</a:t>
             </a:fld>
             <a:endParaRPr lang="fr-FR"/>
           </a:p>
@@ -2065,7 +2072,7 @@
           <a:p>
             <a:fld id="{40A6E905-B5AB-AC44-9673-03A8CEA14BCA}" type="datetimeFigureOut">
               <a:rPr lang="fr-FR" smtClean="0"/>
-              <a:t>13/12/2023</a:t>
+              <a:t>15/12/2023</a:t>
             </a:fld>
             <a:endParaRPr lang="fr-FR"/>
           </a:p>
@@ -2376,7 +2383,7 @@
           <a:p>
             <a:fld id="{40A6E905-B5AB-AC44-9673-03A8CEA14BCA}" type="datetimeFigureOut">
               <a:rPr lang="fr-FR" smtClean="0"/>
-              <a:t>13/12/2023</a:t>
+              <a:t>15/12/2023</a:t>
             </a:fld>
             <a:endParaRPr lang="fr-FR"/>
           </a:p>
@@ -2664,7 +2671,7 @@
           <a:p>
             <a:fld id="{40A6E905-B5AB-AC44-9673-03A8CEA14BCA}" type="datetimeFigureOut">
               <a:rPr lang="fr-FR" smtClean="0"/>
-              <a:t>13/12/2023</a:t>
+              <a:t>15/12/2023</a:t>
             </a:fld>
             <a:endParaRPr lang="fr-FR"/>
           </a:p>
@@ -2905,7 +2912,7 @@
           <a:p>
             <a:fld id="{40A6E905-B5AB-AC44-9673-03A8CEA14BCA}" type="datetimeFigureOut">
               <a:rPr lang="fr-FR" smtClean="0"/>
-              <a:t>13/12/2023</a:t>
+              <a:t>15/12/2023</a:t>
             </a:fld>
             <a:endParaRPr lang="fr-FR"/>
           </a:p>
@@ -3609,6 +3616,199 @@
 </p:sld>
 </file>
 
+<file path=ppt/slides/slide3.xml><?xml version="1.0" encoding="utf-8"?>
+<p:sld xmlns:a="http://schemas.openxmlformats.org/drawingml/2006/main" xmlns:r="http://schemas.openxmlformats.org/officeDocument/2006/relationships" xmlns:p="http://schemas.openxmlformats.org/presentationml/2006/main">
+  <p:cSld>
+    <p:spTree>
+      <p:nvGrpSpPr>
+        <p:cNvPr id="1" name=""/>
+        <p:cNvGrpSpPr/>
+        <p:nvPr/>
+      </p:nvGrpSpPr>
+      <p:grpSpPr>
+        <a:xfrm>
+          <a:off x="0" y="0"/>
+          <a:ext cx="0" cy="0"/>
+          <a:chOff x="0" y="0"/>
+          <a:chExt cx="0" cy="0"/>
+        </a:xfrm>
+      </p:grpSpPr>
+      <p:sp>
+        <p:nvSpPr>
+          <p:cNvPr id="2" name="Titre 1">
+            <a:extLst>
+              <a:ext uri="{FF2B5EF4-FFF2-40B4-BE49-F238E27FC236}">
+                <a16:creationId xmlns:a16="http://schemas.microsoft.com/office/drawing/2014/main" id="{6410BF9F-7E3F-9795-125F-6B719D6CF5BE}"/>
+              </a:ext>
+            </a:extLst>
+          </p:cNvPr>
+          <p:cNvSpPr>
+            <a:spLocks noGrp="1"/>
+          </p:cNvSpPr>
+          <p:nvPr>
+            <p:ph type="title"/>
+          </p:nvPr>
+        </p:nvSpPr>
+        <p:spPr/>
+        <p:txBody>
+          <a:bodyPr/>
+          <a:lstStyle/>
+          <a:p>
+            <a:r>
+              <a:rPr lang="fr-FR" dirty="0"/>
+              <a:t>Hypothèses</a:t>
+            </a:r>
+          </a:p>
+        </p:txBody>
+      </p:sp>
+      <p:sp>
+        <p:nvSpPr>
+          <p:cNvPr id="3" name="Espace réservé du contenu 2">
+            <a:extLst>
+              <a:ext uri="{FF2B5EF4-FFF2-40B4-BE49-F238E27FC236}">
+                <a16:creationId xmlns:a16="http://schemas.microsoft.com/office/drawing/2014/main" id="{F810667A-3203-F804-266B-3CA1317D811C}"/>
+              </a:ext>
+            </a:extLst>
+          </p:cNvPr>
+          <p:cNvSpPr>
+            <a:spLocks noGrp="1"/>
+          </p:cNvSpPr>
+          <p:nvPr>
+            <p:ph idx="1"/>
+          </p:nvPr>
+        </p:nvSpPr>
+        <p:spPr/>
+        <p:txBody>
+          <a:bodyPr/>
+          <a:lstStyle/>
+          <a:p>
+            <a:r>
+              <a:rPr lang="fr-FR" dirty="0"/>
+              <a:t>Pas d’éolien off-shore</a:t>
+            </a:r>
+          </a:p>
+          <a:p>
+            <a:r>
+              <a:rPr lang="fr-FR" dirty="0"/>
+              <a:t>Pas de solaire au sol -&gt; uniquement toiture</a:t>
+            </a:r>
+          </a:p>
+        </p:txBody>
+      </p:sp>
+    </p:spTree>
+    <p:extLst>
+      <p:ext uri="{BB962C8B-B14F-4D97-AF65-F5344CB8AC3E}">
+        <p14:creationId xmlns:p14="http://schemas.microsoft.com/office/powerpoint/2010/main" val="3187893851"/>
+      </p:ext>
+    </p:extLst>
+  </p:cSld>
+  <p:clrMapOvr>
+    <a:masterClrMapping/>
+  </p:clrMapOvr>
+</p:sld>
+</file>
+
+<file path=ppt/slides/slide4.xml><?xml version="1.0" encoding="utf-8"?>
+<p:sld xmlns:a="http://schemas.openxmlformats.org/drawingml/2006/main" xmlns:r="http://schemas.openxmlformats.org/officeDocument/2006/relationships" xmlns:p="http://schemas.openxmlformats.org/presentationml/2006/main">
+  <p:cSld>
+    <p:spTree>
+      <p:nvGrpSpPr>
+        <p:cNvPr id="1" name=""/>
+        <p:cNvGrpSpPr/>
+        <p:nvPr/>
+      </p:nvGrpSpPr>
+      <p:grpSpPr>
+        <a:xfrm>
+          <a:off x="0" y="0"/>
+          <a:ext cx="0" cy="0"/>
+          <a:chOff x="0" y="0"/>
+          <a:chExt cx="0" cy="0"/>
+        </a:xfrm>
+      </p:grpSpPr>
+      <p:sp>
+        <p:nvSpPr>
+          <p:cNvPr id="2" name="Titre 1">
+            <a:extLst>
+              <a:ext uri="{FF2B5EF4-FFF2-40B4-BE49-F238E27FC236}">
+                <a16:creationId xmlns:a16="http://schemas.microsoft.com/office/drawing/2014/main" id="{8E60D6D7-D7F4-ACD9-62E1-F703767570BB}"/>
+              </a:ext>
+            </a:extLst>
+          </p:cNvPr>
+          <p:cNvSpPr>
+            <a:spLocks noGrp="1"/>
+          </p:cNvSpPr>
+          <p:nvPr>
+            <p:ph type="title"/>
+          </p:nvPr>
+        </p:nvSpPr>
+        <p:spPr/>
+        <p:txBody>
+          <a:bodyPr/>
+          <a:lstStyle/>
+          <a:p>
+            <a:r>
+              <a:rPr lang="fr-FR" dirty="0"/>
+              <a:t>Sources</a:t>
+            </a:r>
+          </a:p>
+        </p:txBody>
+      </p:sp>
+      <p:sp>
+        <p:nvSpPr>
+          <p:cNvPr id="3" name="Espace réservé du contenu 2">
+            <a:extLst>
+              <a:ext uri="{FF2B5EF4-FFF2-40B4-BE49-F238E27FC236}">
+                <a16:creationId xmlns:a16="http://schemas.microsoft.com/office/drawing/2014/main" id="{3DC91AD9-232E-BFEA-4F6D-F9DFDEAB00A7}"/>
+              </a:ext>
+            </a:extLst>
+          </p:cNvPr>
+          <p:cNvSpPr>
+            <a:spLocks noGrp="1"/>
+          </p:cNvSpPr>
+          <p:nvPr>
+            <p:ph idx="1"/>
+          </p:nvPr>
+        </p:nvSpPr>
+        <p:spPr/>
+        <p:txBody>
+          <a:bodyPr/>
+          <a:lstStyle/>
+          <a:p>
+            <a:r>
+              <a:rPr lang="fr-FR" dirty="0"/>
+              <a:t>Futurs énergétiques 2050 - RTE</a:t>
+            </a:r>
+          </a:p>
+          <a:p>
+            <a:r>
+              <a:rPr lang="fr-FR"/>
+              <a:t>World </a:t>
+            </a:r>
+            <a:r>
+              <a:rPr lang="fr-FR" dirty="0"/>
+              <a:t>Energy </a:t>
+            </a:r>
+            <a:r>
+              <a:rPr lang="fr-FR"/>
+              <a:t>Outlook 2020 - IAE</a:t>
+            </a:r>
+            <a:endParaRPr lang="fr-FR" dirty="0"/>
+          </a:p>
+        </p:txBody>
+      </p:sp>
+    </p:spTree>
+    <p:extLst>
+      <p:ext uri="{BB962C8B-B14F-4D97-AF65-F5344CB8AC3E}">
+        <p14:creationId xmlns:p14="http://schemas.microsoft.com/office/powerpoint/2010/main" val="1788369220"/>
+      </p:ext>
+    </p:extLst>
+  </p:cSld>
+  <p:clrMapOvr>
+    <a:masterClrMapping/>
+  </p:clrMapOvr>
+</p:sld>
+</file>
+
 <file path=ppt/theme/theme1.xml><?xml version="1.0" encoding="utf-8"?>
 <a:theme xmlns:a="http://schemas.openxmlformats.org/drawingml/2006/main" name="Thème Office">
   <a:themeElements>

</xml_diff>

<commit_message>
rapport et analyse donée
</commit_message>
<xml_diff>
--- a/rapport.pptx
+++ b/rapport.pptx
@@ -9,6 +9,9 @@
     <p:sldId id="257" r:id="rId3"/>
     <p:sldId id="258" r:id="rId4"/>
     <p:sldId id="259" r:id="rId5"/>
+    <p:sldId id="260" r:id="rId6"/>
+    <p:sldId id="261" r:id="rId7"/>
+    <p:sldId id="262" r:id="rId8"/>
   </p:sldIdLst>
   <p:sldSz cx="12192000" cy="6858000"/>
   <p:notesSz cx="6858000" cy="9144000"/>
@@ -262,7 +265,7 @@
           <a:p>
             <a:fld id="{40A6E905-B5AB-AC44-9673-03A8CEA14BCA}" type="datetimeFigureOut">
               <a:rPr lang="fr-FR" smtClean="0"/>
-              <a:t>15/12/2023</a:t>
+              <a:t>16/12/2023</a:t>
             </a:fld>
             <a:endParaRPr lang="fr-FR"/>
           </a:p>
@@ -460,7 +463,7 @@
           <a:p>
             <a:fld id="{40A6E905-B5AB-AC44-9673-03A8CEA14BCA}" type="datetimeFigureOut">
               <a:rPr lang="fr-FR" smtClean="0"/>
-              <a:t>15/12/2023</a:t>
+              <a:t>16/12/2023</a:t>
             </a:fld>
             <a:endParaRPr lang="fr-FR"/>
           </a:p>
@@ -668,7 +671,7 @@
           <a:p>
             <a:fld id="{40A6E905-B5AB-AC44-9673-03A8CEA14BCA}" type="datetimeFigureOut">
               <a:rPr lang="fr-FR" smtClean="0"/>
-              <a:t>15/12/2023</a:t>
+              <a:t>16/12/2023</a:t>
             </a:fld>
             <a:endParaRPr lang="fr-FR"/>
           </a:p>
@@ -866,7 +869,7 @@
           <a:p>
             <a:fld id="{40A6E905-B5AB-AC44-9673-03A8CEA14BCA}" type="datetimeFigureOut">
               <a:rPr lang="fr-FR" smtClean="0"/>
-              <a:t>15/12/2023</a:t>
+              <a:t>16/12/2023</a:t>
             </a:fld>
             <a:endParaRPr lang="fr-FR"/>
           </a:p>
@@ -1141,7 +1144,7 @@
           <a:p>
             <a:fld id="{40A6E905-B5AB-AC44-9673-03A8CEA14BCA}" type="datetimeFigureOut">
               <a:rPr lang="fr-FR" smtClean="0"/>
-              <a:t>15/12/2023</a:t>
+              <a:t>16/12/2023</a:t>
             </a:fld>
             <a:endParaRPr lang="fr-FR"/>
           </a:p>
@@ -1406,7 +1409,7 @@
           <a:p>
             <a:fld id="{40A6E905-B5AB-AC44-9673-03A8CEA14BCA}" type="datetimeFigureOut">
               <a:rPr lang="fr-FR" smtClean="0"/>
-              <a:t>15/12/2023</a:t>
+              <a:t>16/12/2023</a:t>
             </a:fld>
             <a:endParaRPr lang="fr-FR"/>
           </a:p>
@@ -1818,7 +1821,7 @@
           <a:p>
             <a:fld id="{40A6E905-B5AB-AC44-9673-03A8CEA14BCA}" type="datetimeFigureOut">
               <a:rPr lang="fr-FR" smtClean="0"/>
-              <a:t>15/12/2023</a:t>
+              <a:t>16/12/2023</a:t>
             </a:fld>
             <a:endParaRPr lang="fr-FR"/>
           </a:p>
@@ -1959,7 +1962,7 @@
           <a:p>
             <a:fld id="{40A6E905-B5AB-AC44-9673-03A8CEA14BCA}" type="datetimeFigureOut">
               <a:rPr lang="fr-FR" smtClean="0"/>
-              <a:t>15/12/2023</a:t>
+              <a:t>16/12/2023</a:t>
             </a:fld>
             <a:endParaRPr lang="fr-FR"/>
           </a:p>
@@ -2072,7 +2075,7 @@
           <a:p>
             <a:fld id="{40A6E905-B5AB-AC44-9673-03A8CEA14BCA}" type="datetimeFigureOut">
               <a:rPr lang="fr-FR" smtClean="0"/>
-              <a:t>15/12/2023</a:t>
+              <a:t>16/12/2023</a:t>
             </a:fld>
             <a:endParaRPr lang="fr-FR"/>
           </a:p>
@@ -2383,7 +2386,7 @@
           <a:p>
             <a:fld id="{40A6E905-B5AB-AC44-9673-03A8CEA14BCA}" type="datetimeFigureOut">
               <a:rPr lang="fr-FR" smtClean="0"/>
-              <a:t>15/12/2023</a:t>
+              <a:t>16/12/2023</a:t>
             </a:fld>
             <a:endParaRPr lang="fr-FR"/>
           </a:p>
@@ -2671,7 +2674,7 @@
           <a:p>
             <a:fld id="{40A6E905-B5AB-AC44-9673-03A8CEA14BCA}" type="datetimeFigureOut">
               <a:rPr lang="fr-FR" smtClean="0"/>
-              <a:t>15/12/2023</a:t>
+              <a:t>16/12/2023</a:t>
             </a:fld>
             <a:endParaRPr lang="fr-FR"/>
           </a:p>
@@ -2912,7 +2915,7 @@
           <a:p>
             <a:fld id="{40A6E905-B5AB-AC44-9673-03A8CEA14BCA}" type="datetimeFigureOut">
               <a:rPr lang="fr-FR" smtClean="0"/>
-              <a:t>15/12/2023</a:t>
+              <a:t>16/12/2023</a:t>
             </a:fld>
             <a:endParaRPr lang="fr-FR"/>
           </a:p>
@@ -3693,6 +3696,18 @@
               <a:t>Pas de solaire au sol -&gt; uniquement toiture</a:t>
             </a:r>
           </a:p>
+          <a:p>
+            <a:r>
+              <a:rPr lang="fr-FR" dirty="0"/>
+              <a:t>xx Habitants sur l’île (règle de 3 sur la conso avec la France)</a:t>
+            </a:r>
+          </a:p>
+          <a:p>
+            <a:pPr marL="0" indent="0">
+              <a:buNone/>
+            </a:pPr>
+            <a:endParaRPr lang="fr-FR" dirty="0"/>
+          </a:p>
         </p:txBody>
       </p:sp>
     </p:spTree>
@@ -3800,6 +3815,652 @@
     <p:extLst>
       <p:ext uri="{BB962C8B-B14F-4D97-AF65-F5344CB8AC3E}">
         <p14:creationId xmlns:p14="http://schemas.microsoft.com/office/powerpoint/2010/main" val="1788369220"/>
+      </p:ext>
+    </p:extLst>
+  </p:cSld>
+  <p:clrMapOvr>
+    <a:masterClrMapping/>
+  </p:clrMapOvr>
+</p:sld>
+</file>
+
+<file path=ppt/slides/slide5.xml><?xml version="1.0" encoding="utf-8"?>
+<p:sld xmlns:a="http://schemas.openxmlformats.org/drawingml/2006/main" xmlns:r="http://schemas.openxmlformats.org/officeDocument/2006/relationships" xmlns:p="http://schemas.openxmlformats.org/presentationml/2006/main">
+  <p:cSld>
+    <p:spTree>
+      <p:nvGrpSpPr>
+        <p:cNvPr id="1" name=""/>
+        <p:cNvGrpSpPr/>
+        <p:nvPr/>
+      </p:nvGrpSpPr>
+      <p:grpSpPr>
+        <a:xfrm>
+          <a:off x="0" y="0"/>
+          <a:ext cx="0" cy="0"/>
+          <a:chOff x="0" y="0"/>
+          <a:chExt cx="0" cy="0"/>
+        </a:xfrm>
+      </p:grpSpPr>
+      <p:sp>
+        <p:nvSpPr>
+          <p:cNvPr id="2" name="Titre 1">
+            <a:extLst>
+              <a:ext uri="{FF2B5EF4-FFF2-40B4-BE49-F238E27FC236}">
+                <a16:creationId xmlns:a16="http://schemas.microsoft.com/office/drawing/2014/main" id="{0AEE65A6-0C7D-D77F-BD84-ABFC4A7D677F}"/>
+              </a:ext>
+            </a:extLst>
+          </p:cNvPr>
+          <p:cNvSpPr>
+            <a:spLocks noGrp="1"/>
+          </p:cNvSpPr>
+          <p:nvPr>
+            <p:ph type="title"/>
+          </p:nvPr>
+        </p:nvSpPr>
+        <p:spPr/>
+        <p:txBody>
+          <a:bodyPr/>
+          <a:lstStyle/>
+          <a:p>
+            <a:r>
+              <a:rPr lang="fr-FR" dirty="0"/>
+              <a:t>Hypothèses des coûts</a:t>
+            </a:r>
+          </a:p>
+        </p:txBody>
+      </p:sp>
+      <p:graphicFrame>
+        <p:nvGraphicFramePr>
+          <p:cNvPr id="4" name="Espace réservé du contenu 3">
+            <a:extLst>
+              <a:ext uri="{FF2B5EF4-FFF2-40B4-BE49-F238E27FC236}">
+                <a16:creationId xmlns:a16="http://schemas.microsoft.com/office/drawing/2014/main" id="{BC6F1049-A7CA-EA9E-4239-006FAFC5D243}"/>
+              </a:ext>
+            </a:extLst>
+          </p:cNvPr>
+          <p:cNvGraphicFramePr>
+            <a:graphicFrameLocks noGrp="1"/>
+          </p:cNvGraphicFramePr>
+          <p:nvPr>
+            <p:ph idx="1"/>
+            <p:extLst>
+              <p:ext uri="{D42A27DB-BD31-4B8C-83A1-F6EECF244321}">
+                <p14:modId xmlns:p14="http://schemas.microsoft.com/office/powerpoint/2010/main" val="2226967191"/>
+              </p:ext>
+            </p:extLst>
+          </p:nvPr>
+        </p:nvGraphicFramePr>
+        <p:xfrm>
+          <a:off x="838200" y="1825625"/>
+          <a:ext cx="10515597" cy="2225040"/>
+        </p:xfrm>
+        <a:graphic>
+          <a:graphicData uri="http://schemas.openxmlformats.org/drawingml/2006/table">
+            <a:tbl>
+              <a:tblPr firstRow="1" firstCol="1" bandRow="1">
+                <a:tableStyleId>{5C22544A-7EE6-4342-B048-85BDC9FD1C3A}</a:tableStyleId>
+              </a:tblPr>
+              <a:tblGrid>
+                <a:gridCol w="3505199">
+                  <a:extLst>
+                    <a:ext uri="{9D8B030D-6E8A-4147-A177-3AD203B41FA5}">
+                      <a16:colId xmlns:a16="http://schemas.microsoft.com/office/drawing/2014/main" val="315530076"/>
+                    </a:ext>
+                  </a:extLst>
+                </a:gridCol>
+                <a:gridCol w="3505199">
+                  <a:extLst>
+                    <a:ext uri="{9D8B030D-6E8A-4147-A177-3AD203B41FA5}">
+                      <a16:colId xmlns:a16="http://schemas.microsoft.com/office/drawing/2014/main" val="3572474061"/>
+                    </a:ext>
+                  </a:extLst>
+                </a:gridCol>
+                <a:gridCol w="3505199">
+                  <a:extLst>
+                    <a:ext uri="{9D8B030D-6E8A-4147-A177-3AD203B41FA5}">
+                      <a16:colId xmlns:a16="http://schemas.microsoft.com/office/drawing/2014/main" val="2628995089"/>
+                    </a:ext>
+                  </a:extLst>
+                </a:gridCol>
+              </a:tblGrid>
+              <a:tr h="370840">
+                <a:tc>
+                  <a:txBody>
+                    <a:bodyPr/>
+                    <a:lstStyle/>
+                    <a:p>
+                      <a:endParaRPr lang="fr-FR"/>
+                    </a:p>
+                  </a:txBody>
+                  <a:tcPr/>
+                </a:tc>
+                <a:tc>
+                  <a:txBody>
+                    <a:bodyPr/>
+                    <a:lstStyle/>
+                    <a:p>
+                      <a:r>
+                        <a:rPr lang="fr-FR" dirty="0"/>
+                        <a:t>CAPEX (€/MWh)</a:t>
+                      </a:r>
+                    </a:p>
+                  </a:txBody>
+                  <a:tcPr/>
+                </a:tc>
+                <a:tc>
+                  <a:txBody>
+                    <a:bodyPr/>
+                    <a:lstStyle/>
+                    <a:p>
+                      <a:r>
+                        <a:rPr lang="fr-FR" dirty="0"/>
+                        <a:t>OPEX (€/</a:t>
+                      </a:r>
+                      <a:r>
+                        <a:rPr lang="fr-FR" dirty="0" err="1"/>
+                        <a:t>MWh.an</a:t>
+                      </a:r>
+                      <a:r>
+                        <a:rPr lang="fr-FR" dirty="0"/>
+                        <a:t>)</a:t>
+                      </a:r>
+                    </a:p>
+                  </a:txBody>
+                  <a:tcPr/>
+                </a:tc>
+                <a:extLst>
+                  <a:ext uri="{0D108BD9-81ED-4DB2-BD59-A6C34878D82A}">
+                    <a16:rowId xmlns:a16="http://schemas.microsoft.com/office/drawing/2014/main" val="2468328423"/>
+                  </a:ext>
+                </a:extLst>
+              </a:tr>
+              <a:tr h="370840">
+                <a:tc>
+                  <a:txBody>
+                    <a:bodyPr/>
+                    <a:lstStyle/>
+                    <a:p>
+                      <a:r>
+                        <a:rPr lang="fr-FR" dirty="0"/>
+                        <a:t>Diesel</a:t>
+                      </a:r>
+                    </a:p>
+                  </a:txBody>
+                  <a:tcPr/>
+                </a:tc>
+                <a:tc>
+                  <a:txBody>
+                    <a:bodyPr/>
+                    <a:lstStyle/>
+                    <a:p>
+                      <a:endParaRPr lang="fr-FR"/>
+                    </a:p>
+                  </a:txBody>
+                  <a:tcPr/>
+                </a:tc>
+                <a:tc>
+                  <a:txBody>
+                    <a:bodyPr/>
+                    <a:lstStyle/>
+                    <a:p>
+                      <a:r>
+                        <a:rPr lang="fr-FR" dirty="0"/>
+                        <a:t>101 000</a:t>
+                      </a:r>
+                    </a:p>
+                  </a:txBody>
+                  <a:tcPr/>
+                </a:tc>
+                <a:extLst>
+                  <a:ext uri="{0D108BD9-81ED-4DB2-BD59-A6C34878D82A}">
+                    <a16:rowId xmlns:a16="http://schemas.microsoft.com/office/drawing/2014/main" val="895590090"/>
+                  </a:ext>
+                </a:extLst>
+              </a:tr>
+              <a:tr h="370840">
+                <a:tc>
+                  <a:txBody>
+                    <a:bodyPr/>
+                    <a:lstStyle/>
+                    <a:p>
+                      <a:r>
+                        <a:rPr lang="fr-FR" dirty="0"/>
+                        <a:t>Solaire au sol</a:t>
+                      </a:r>
+                    </a:p>
+                  </a:txBody>
+                  <a:tcPr/>
+                </a:tc>
+                <a:tc>
+                  <a:txBody>
+                    <a:bodyPr/>
+                    <a:lstStyle/>
+                    <a:p>
+                      <a:endParaRPr lang="fr-FR"/>
+                    </a:p>
+                  </a:txBody>
+                  <a:tcPr/>
+                </a:tc>
+                <a:tc>
+                  <a:txBody>
+                    <a:bodyPr/>
+                    <a:lstStyle/>
+                    <a:p>
+                      <a:r>
+                        <a:rPr lang="fr-FR" dirty="0"/>
+                        <a:t>11 000</a:t>
+                      </a:r>
+                    </a:p>
+                  </a:txBody>
+                  <a:tcPr/>
+                </a:tc>
+                <a:extLst>
+                  <a:ext uri="{0D108BD9-81ED-4DB2-BD59-A6C34878D82A}">
+                    <a16:rowId xmlns:a16="http://schemas.microsoft.com/office/drawing/2014/main" val="371147302"/>
+                  </a:ext>
+                </a:extLst>
+              </a:tr>
+              <a:tr h="370840">
+                <a:tc>
+                  <a:txBody>
+                    <a:bodyPr/>
+                    <a:lstStyle/>
+                    <a:p>
+                      <a:r>
+                        <a:rPr lang="fr-FR" dirty="0"/>
+                        <a:t>Solaire sur toiture</a:t>
+                      </a:r>
+                    </a:p>
+                  </a:txBody>
+                  <a:tcPr/>
+                </a:tc>
+                <a:tc>
+                  <a:txBody>
+                    <a:bodyPr/>
+                    <a:lstStyle/>
+                    <a:p>
+                      <a:endParaRPr lang="fr-FR"/>
+                    </a:p>
+                  </a:txBody>
+                  <a:tcPr/>
+                </a:tc>
+                <a:tc>
+                  <a:txBody>
+                    <a:bodyPr/>
+                    <a:lstStyle/>
+                    <a:p>
+                      <a:r>
+                        <a:rPr lang="fr-FR" dirty="0"/>
+                        <a:t>20 000</a:t>
+                      </a:r>
+                    </a:p>
+                  </a:txBody>
+                  <a:tcPr/>
+                </a:tc>
+                <a:extLst>
+                  <a:ext uri="{0D108BD9-81ED-4DB2-BD59-A6C34878D82A}">
+                    <a16:rowId xmlns:a16="http://schemas.microsoft.com/office/drawing/2014/main" val="29569578"/>
+                  </a:ext>
+                </a:extLst>
+              </a:tr>
+              <a:tr h="370840">
+                <a:tc>
+                  <a:txBody>
+                    <a:bodyPr/>
+                    <a:lstStyle/>
+                    <a:p>
+                      <a:r>
+                        <a:rPr lang="fr-FR" dirty="0"/>
+                        <a:t>Éolien terrestre</a:t>
+                      </a:r>
+                    </a:p>
+                  </a:txBody>
+                  <a:tcPr/>
+                </a:tc>
+                <a:tc>
+                  <a:txBody>
+                    <a:bodyPr/>
+                    <a:lstStyle/>
+                    <a:p>
+                      <a:endParaRPr lang="fr-FR"/>
+                    </a:p>
+                  </a:txBody>
+                  <a:tcPr/>
+                </a:tc>
+                <a:tc>
+                  <a:txBody>
+                    <a:bodyPr/>
+                    <a:lstStyle/>
+                    <a:p>
+                      <a:r>
+                        <a:rPr lang="fr-FR" dirty="0"/>
+                        <a:t>40 000</a:t>
+                      </a:r>
+                    </a:p>
+                  </a:txBody>
+                  <a:tcPr/>
+                </a:tc>
+                <a:extLst>
+                  <a:ext uri="{0D108BD9-81ED-4DB2-BD59-A6C34878D82A}">
+                    <a16:rowId xmlns:a16="http://schemas.microsoft.com/office/drawing/2014/main" val="426465920"/>
+                  </a:ext>
+                </a:extLst>
+              </a:tr>
+              <a:tr h="370840">
+                <a:tc>
+                  <a:txBody>
+                    <a:bodyPr/>
+                    <a:lstStyle/>
+                    <a:p>
+                      <a:r>
+                        <a:rPr lang="fr-FR" dirty="0"/>
+                        <a:t>Éolien off-shore</a:t>
+                      </a:r>
+                    </a:p>
+                  </a:txBody>
+                  <a:tcPr/>
+                </a:tc>
+                <a:tc>
+                  <a:txBody>
+                    <a:bodyPr/>
+                    <a:lstStyle/>
+                    <a:p>
+                      <a:endParaRPr lang="fr-FR"/>
+                    </a:p>
+                  </a:txBody>
+                  <a:tcPr/>
+                </a:tc>
+                <a:tc>
+                  <a:txBody>
+                    <a:bodyPr/>
+                    <a:lstStyle/>
+                    <a:p>
+                      <a:r>
+                        <a:rPr lang="fr-FR" dirty="0"/>
+                        <a:t>80 000</a:t>
+                      </a:r>
+                    </a:p>
+                  </a:txBody>
+                  <a:tcPr/>
+                </a:tc>
+                <a:extLst>
+                  <a:ext uri="{0D108BD9-81ED-4DB2-BD59-A6C34878D82A}">
+                    <a16:rowId xmlns:a16="http://schemas.microsoft.com/office/drawing/2014/main" val="1451350444"/>
+                  </a:ext>
+                </a:extLst>
+              </a:tr>
+            </a:tbl>
+          </a:graphicData>
+        </a:graphic>
+      </p:graphicFrame>
+    </p:spTree>
+    <p:extLst>
+      <p:ext uri="{BB962C8B-B14F-4D97-AF65-F5344CB8AC3E}">
+        <p14:creationId xmlns:p14="http://schemas.microsoft.com/office/powerpoint/2010/main" val="1961975441"/>
+      </p:ext>
+    </p:extLst>
+  </p:cSld>
+  <p:clrMapOvr>
+    <a:masterClrMapping/>
+  </p:clrMapOvr>
+</p:sld>
+</file>
+
+<file path=ppt/slides/slide6.xml><?xml version="1.0" encoding="utf-8"?>
+<p:sld xmlns:a="http://schemas.openxmlformats.org/drawingml/2006/main" xmlns:r="http://schemas.openxmlformats.org/officeDocument/2006/relationships" xmlns:p="http://schemas.openxmlformats.org/presentationml/2006/main">
+  <p:cSld>
+    <p:spTree>
+      <p:nvGrpSpPr>
+        <p:cNvPr id="1" name=""/>
+        <p:cNvGrpSpPr/>
+        <p:nvPr/>
+      </p:nvGrpSpPr>
+      <p:grpSpPr>
+        <a:xfrm>
+          <a:off x="0" y="0"/>
+          <a:ext cx="0" cy="0"/>
+          <a:chOff x="0" y="0"/>
+          <a:chExt cx="0" cy="0"/>
+        </a:xfrm>
+      </p:grpSpPr>
+      <p:sp>
+        <p:nvSpPr>
+          <p:cNvPr id="2" name="Titre 1">
+            <a:extLst>
+              <a:ext uri="{FF2B5EF4-FFF2-40B4-BE49-F238E27FC236}">
+                <a16:creationId xmlns:a16="http://schemas.microsoft.com/office/drawing/2014/main" id="{A3E95A17-1240-8030-7F5B-087655858295}"/>
+              </a:ext>
+            </a:extLst>
+          </p:cNvPr>
+          <p:cNvSpPr>
+            <a:spLocks noGrp="1"/>
+          </p:cNvSpPr>
+          <p:nvPr>
+            <p:ph type="title"/>
+          </p:nvPr>
+        </p:nvSpPr>
+        <p:spPr/>
+        <p:txBody>
+          <a:bodyPr/>
+          <a:lstStyle/>
+          <a:p>
+            <a:r>
+              <a:rPr lang="fr-FR" dirty="0"/>
+              <a:t>Scénarios</a:t>
+            </a:r>
+          </a:p>
+        </p:txBody>
+      </p:sp>
+      <p:sp>
+        <p:nvSpPr>
+          <p:cNvPr id="3" name="Espace réservé du contenu 2">
+            <a:extLst>
+              <a:ext uri="{FF2B5EF4-FFF2-40B4-BE49-F238E27FC236}">
+                <a16:creationId xmlns:a16="http://schemas.microsoft.com/office/drawing/2014/main" id="{26D07565-249A-F223-BA03-29F59D0E1053}"/>
+              </a:ext>
+            </a:extLst>
+          </p:cNvPr>
+          <p:cNvSpPr>
+            <a:spLocks noGrp="1"/>
+          </p:cNvSpPr>
+          <p:nvPr>
+            <p:ph idx="1"/>
+          </p:nvPr>
+        </p:nvSpPr>
+        <p:spPr/>
+        <p:txBody>
+          <a:bodyPr/>
+          <a:lstStyle/>
+          <a:p>
+            <a:r>
+              <a:rPr lang="fr-FR" dirty="0"/>
+              <a:t>Optimisation sur le coûts</a:t>
+            </a:r>
+          </a:p>
+          <a:p>
+            <a:r>
+              <a:rPr lang="fr-FR" dirty="0"/>
+              <a:t>Optimisation sur la pollution</a:t>
+            </a:r>
+          </a:p>
+          <a:p>
+            <a:r>
+              <a:rPr lang="fr-FR" dirty="0"/>
+              <a:t>Optimisation en prenant en compte le foisonnement</a:t>
+            </a:r>
+          </a:p>
+        </p:txBody>
+      </p:sp>
+    </p:spTree>
+    <p:extLst>
+      <p:ext uri="{BB962C8B-B14F-4D97-AF65-F5344CB8AC3E}">
+        <p14:creationId xmlns:p14="http://schemas.microsoft.com/office/powerpoint/2010/main" val="4049711483"/>
+      </p:ext>
+    </p:extLst>
+  </p:cSld>
+  <p:clrMapOvr>
+    <a:masterClrMapping/>
+  </p:clrMapOvr>
+</p:sld>
+</file>
+
+<file path=ppt/slides/slide7.xml><?xml version="1.0" encoding="utf-8"?>
+<p:sld xmlns:a="http://schemas.openxmlformats.org/drawingml/2006/main" xmlns:r="http://schemas.openxmlformats.org/officeDocument/2006/relationships" xmlns:p="http://schemas.openxmlformats.org/presentationml/2006/main">
+  <p:cSld>
+    <p:spTree>
+      <p:nvGrpSpPr>
+        <p:cNvPr id="1" name=""/>
+        <p:cNvGrpSpPr/>
+        <p:nvPr/>
+      </p:nvGrpSpPr>
+      <p:grpSpPr>
+        <a:xfrm>
+          <a:off x="0" y="0"/>
+          <a:ext cx="0" cy="0"/>
+          <a:chOff x="0" y="0"/>
+          <a:chExt cx="0" cy="0"/>
+        </a:xfrm>
+      </p:grpSpPr>
+      <p:sp>
+        <p:nvSpPr>
+          <p:cNvPr id="2" name="Titre 1">
+            <a:extLst>
+              <a:ext uri="{FF2B5EF4-FFF2-40B4-BE49-F238E27FC236}">
+                <a16:creationId xmlns:a16="http://schemas.microsoft.com/office/drawing/2014/main" id="{5F03E97A-003A-99CD-7642-F8F39407F91C}"/>
+              </a:ext>
+            </a:extLst>
+          </p:cNvPr>
+          <p:cNvSpPr>
+            <a:spLocks noGrp="1"/>
+          </p:cNvSpPr>
+          <p:nvPr>
+            <p:ph type="title"/>
+          </p:nvPr>
+        </p:nvSpPr>
+        <p:spPr/>
+        <p:txBody>
+          <a:bodyPr/>
+          <a:lstStyle/>
+          <a:p>
+            <a:r>
+              <a:rPr lang="fr-FR" dirty="0"/>
+              <a:t>Résultats</a:t>
+            </a:r>
+          </a:p>
+        </p:txBody>
+      </p:sp>
+      <p:sp>
+        <p:nvSpPr>
+          <p:cNvPr id="4" name="ZoneTexte 3">
+            <a:extLst>
+              <a:ext uri="{FF2B5EF4-FFF2-40B4-BE49-F238E27FC236}">
+                <a16:creationId xmlns:a16="http://schemas.microsoft.com/office/drawing/2014/main" id="{9509944C-6760-3574-A0D8-6622D18A6B77}"/>
+              </a:ext>
+            </a:extLst>
+          </p:cNvPr>
+          <p:cNvSpPr txBox="1"/>
+          <p:nvPr/>
+        </p:nvSpPr>
+        <p:spPr>
+          <a:xfrm>
+            <a:off x="1721707" y="6067170"/>
+            <a:ext cx="1346886" cy="369332"/>
+          </a:xfrm>
+          <a:prstGeom prst="rect">
+            <a:avLst/>
+          </a:prstGeom>
+          <a:noFill/>
+        </p:spPr>
+        <p:txBody>
+          <a:bodyPr wrap="square" rtlCol="0">
+            <a:spAutoFit/>
+          </a:bodyPr>
+          <a:lstStyle/>
+          <a:p>
+            <a:pPr algn="ctr"/>
+            <a:r>
+              <a:rPr lang="fr-FR" dirty="0"/>
+              <a:t>Scénario 1</a:t>
+            </a:r>
+          </a:p>
+        </p:txBody>
+      </p:sp>
+      <p:sp>
+        <p:nvSpPr>
+          <p:cNvPr id="5" name="ZoneTexte 4">
+            <a:extLst>
+              <a:ext uri="{FF2B5EF4-FFF2-40B4-BE49-F238E27FC236}">
+                <a16:creationId xmlns:a16="http://schemas.microsoft.com/office/drawing/2014/main" id="{20F8F632-A963-4DF1-AF0E-C97FCA9010BD}"/>
+              </a:ext>
+            </a:extLst>
+          </p:cNvPr>
+          <p:cNvSpPr txBox="1"/>
+          <p:nvPr/>
+        </p:nvSpPr>
+        <p:spPr>
+          <a:xfrm>
+            <a:off x="5422557" y="6067170"/>
+            <a:ext cx="1346886" cy="369332"/>
+          </a:xfrm>
+          <a:prstGeom prst="rect">
+            <a:avLst/>
+          </a:prstGeom>
+          <a:noFill/>
+        </p:spPr>
+        <p:txBody>
+          <a:bodyPr wrap="square" rtlCol="0">
+            <a:spAutoFit/>
+          </a:bodyPr>
+          <a:lstStyle/>
+          <a:p>
+            <a:pPr algn="ctr"/>
+            <a:r>
+              <a:rPr lang="fr-FR" dirty="0"/>
+              <a:t>Scénario 2</a:t>
+            </a:r>
+          </a:p>
+        </p:txBody>
+      </p:sp>
+      <p:sp>
+        <p:nvSpPr>
+          <p:cNvPr id="6" name="ZoneTexte 5">
+            <a:extLst>
+              <a:ext uri="{FF2B5EF4-FFF2-40B4-BE49-F238E27FC236}">
+                <a16:creationId xmlns:a16="http://schemas.microsoft.com/office/drawing/2014/main" id="{D173CA55-35E0-8C80-FD12-86BBF74897A1}"/>
+              </a:ext>
+            </a:extLst>
+          </p:cNvPr>
+          <p:cNvSpPr txBox="1"/>
+          <p:nvPr/>
+        </p:nvSpPr>
+        <p:spPr>
+          <a:xfrm>
+            <a:off x="9123407" y="6067170"/>
+            <a:ext cx="1346886" cy="369332"/>
+          </a:xfrm>
+          <a:prstGeom prst="rect">
+            <a:avLst/>
+          </a:prstGeom>
+          <a:noFill/>
+        </p:spPr>
+        <p:txBody>
+          <a:bodyPr wrap="square" rtlCol="0">
+            <a:spAutoFit/>
+          </a:bodyPr>
+          <a:lstStyle/>
+          <a:p>
+            <a:pPr algn="ctr"/>
+            <a:r>
+              <a:rPr lang="fr-FR" dirty="0"/>
+              <a:t>Scénario 3</a:t>
+            </a:r>
+          </a:p>
+        </p:txBody>
+      </p:sp>
+    </p:spTree>
+    <p:extLst>
+      <p:ext uri="{BB962C8B-B14F-4D97-AF65-F5344CB8AC3E}">
+        <p14:creationId xmlns:p14="http://schemas.microsoft.com/office/powerpoint/2010/main" val="2376248714"/>
       </p:ext>
     </p:extLst>
   </p:cSld>

</xml_diff>